<commit_message>
implement shifts to arbitrary bits number; need to add more tests
</commit_message>
<xml_diff>
--- a/DOC/02_pipeline.pptx
+++ b/DOC/02_pipeline.pptx
@@ -245,7 +245,7 @@
           <a:p>
             <a:fld id="{EE595349-DA93-472D-828A-76CE9E4C1479}" type="datetimeFigureOut">
               <a:rPr lang="ru-RU" smtClean="0"/>
-              <a:t>17.03.2018</a:t>
+              <a:t>24.03.2018</a:t>
             </a:fld>
             <a:endParaRPr lang="ru-RU"/>
           </a:p>
@@ -415,7 +415,7 @@
           <a:p>
             <a:fld id="{EE595349-DA93-472D-828A-76CE9E4C1479}" type="datetimeFigureOut">
               <a:rPr lang="ru-RU" smtClean="0"/>
-              <a:t>17.03.2018</a:t>
+              <a:t>24.03.2018</a:t>
             </a:fld>
             <a:endParaRPr lang="ru-RU"/>
           </a:p>
@@ -595,7 +595,7 @@
           <a:p>
             <a:fld id="{EE595349-DA93-472D-828A-76CE9E4C1479}" type="datetimeFigureOut">
               <a:rPr lang="ru-RU" smtClean="0"/>
-              <a:t>17.03.2018</a:t>
+              <a:t>24.03.2018</a:t>
             </a:fld>
             <a:endParaRPr lang="ru-RU"/>
           </a:p>
@@ -765,7 +765,7 @@
           <a:p>
             <a:fld id="{EE595349-DA93-472D-828A-76CE9E4C1479}" type="datetimeFigureOut">
               <a:rPr lang="ru-RU" smtClean="0"/>
-              <a:t>17.03.2018</a:t>
+              <a:t>24.03.2018</a:t>
             </a:fld>
             <a:endParaRPr lang="ru-RU"/>
           </a:p>
@@ -1011,7 +1011,7 @@
           <a:p>
             <a:fld id="{EE595349-DA93-472D-828A-76CE9E4C1479}" type="datetimeFigureOut">
               <a:rPr lang="ru-RU" smtClean="0"/>
-              <a:t>17.03.2018</a:t>
+              <a:t>24.03.2018</a:t>
             </a:fld>
             <a:endParaRPr lang="ru-RU"/>
           </a:p>
@@ -1243,7 +1243,7 @@
           <a:p>
             <a:fld id="{EE595349-DA93-472D-828A-76CE9E4C1479}" type="datetimeFigureOut">
               <a:rPr lang="ru-RU" smtClean="0"/>
-              <a:t>17.03.2018</a:t>
+              <a:t>24.03.2018</a:t>
             </a:fld>
             <a:endParaRPr lang="ru-RU"/>
           </a:p>
@@ -1610,7 +1610,7 @@
           <a:p>
             <a:fld id="{EE595349-DA93-472D-828A-76CE9E4C1479}" type="datetimeFigureOut">
               <a:rPr lang="ru-RU" smtClean="0"/>
-              <a:t>17.03.2018</a:t>
+              <a:t>24.03.2018</a:t>
             </a:fld>
             <a:endParaRPr lang="ru-RU"/>
           </a:p>
@@ -1728,7 +1728,7 @@
           <a:p>
             <a:fld id="{EE595349-DA93-472D-828A-76CE9E4C1479}" type="datetimeFigureOut">
               <a:rPr lang="ru-RU" smtClean="0"/>
-              <a:t>17.03.2018</a:t>
+              <a:t>24.03.2018</a:t>
             </a:fld>
             <a:endParaRPr lang="ru-RU"/>
           </a:p>
@@ -1823,7 +1823,7 @@
           <a:p>
             <a:fld id="{EE595349-DA93-472D-828A-76CE9E4C1479}" type="datetimeFigureOut">
               <a:rPr lang="ru-RU" smtClean="0"/>
-              <a:t>17.03.2018</a:t>
+              <a:t>24.03.2018</a:t>
             </a:fld>
             <a:endParaRPr lang="ru-RU"/>
           </a:p>
@@ -2100,7 +2100,7 @@
           <a:p>
             <a:fld id="{EE595349-DA93-472D-828A-76CE9E4C1479}" type="datetimeFigureOut">
               <a:rPr lang="ru-RU" smtClean="0"/>
-              <a:t>17.03.2018</a:t>
+              <a:t>24.03.2018</a:t>
             </a:fld>
             <a:endParaRPr lang="ru-RU"/>
           </a:p>
@@ -2353,7 +2353,7 @@
           <a:p>
             <a:fld id="{EE595349-DA93-472D-828A-76CE9E4C1479}" type="datetimeFigureOut">
               <a:rPr lang="ru-RU" smtClean="0"/>
-              <a:t>17.03.2018</a:t>
+              <a:t>24.03.2018</a:t>
             </a:fld>
             <a:endParaRPr lang="ru-RU"/>
           </a:p>
@@ -2566,7 +2566,7 @@
           <a:p>
             <a:fld id="{EE595349-DA93-472D-828A-76CE9E4C1479}" type="datetimeFigureOut">
               <a:rPr lang="ru-RU" smtClean="0"/>
-              <a:t>17.03.2018</a:t>
+              <a:t>24.03.2018</a:t>
             </a:fld>
             <a:endParaRPr lang="ru-RU"/>
           </a:p>
@@ -3119,8 +3119,13 @@
             <a:pPr lvl="1"/>
             <a:r>
               <a:rPr lang="en-US" dirty="0" smtClean="0"/>
-              <a:t>Out of Order Execution   (E)</a:t>
-            </a:r>
+              <a:t>Out of Order Execution   </a:t>
+            </a:r>
+            <a:r>
+              <a:rPr lang="en-US" dirty="0" smtClean="0"/>
+              <a:t>(X)</a:t>
+            </a:r>
+            <a:endParaRPr lang="en-US" dirty="0" smtClean="0"/>
           </a:p>
           <a:p>
             <a:pPr lvl="1"/>
@@ -3164,19 +3169,7 @@
             <a:pPr lvl="1"/>
             <a:r>
               <a:rPr lang="en-US" dirty="0" smtClean="0"/>
-              <a:t>WPIPE </a:t>
-            </a:r>
-            <a:r>
-              <a:rPr lang="en-US" dirty="0" smtClean="0"/>
-              <a:t>stores </a:t>
-            </a:r>
-            <a:r>
-              <a:rPr lang="en-US" dirty="0" smtClean="0"/>
-              <a:t>WB bit and register that we are going to </a:t>
-            </a:r>
-            <a:r>
-              <a:rPr lang="en-US" dirty="0" smtClean="0"/>
-              <a:t>write</a:t>
+              <a:t>WPIPE stores WB bit and register that we are going to write</a:t>
             </a:r>
           </a:p>
           <a:p>

</xml_diff>